<commit_message>
added back in code for basis of gensim analysis
</commit_message>
<xml_diff>
--- a/Final Project Ideas.pptx
+++ b/Final Project Ideas.pptx
@@ -219,7 +219,7 @@
           <a:p>
             <a:fld id="{04BC9019-C8A6-4B90-8F56-686087AC6712}" type="datetimeFigureOut">
               <a:rPr lang="en-US" smtClean="0"/>
-              <a:t>3/13/2021</a:t>
+              <a:t>3/15/2021</a:t>
             </a:fld>
             <a:endParaRPr lang="en-US"/>
           </a:p>
@@ -542,7 +542,10 @@
             </a:r>
           </a:p>
           <a:p>
-            <a:endParaRPr lang="en-US" dirty="0"/>
+            <a:r>
+              <a:rPr lang="en-US" dirty="0"/>
+              <a:t>https://www.datacamp.com/community/tutorials/wordcloud-python</a:t>
+            </a:r>
           </a:p>
           <a:p>
             <a:r>
@@ -760,7 +763,7 @@
           <a:p>
             <a:fld id="{E25CC89C-45C9-47D1-BCFB-36AC0404138F}" type="datetimeFigureOut">
               <a:rPr lang="en-US" smtClean="0"/>
-              <a:t>3/13/2021</a:t>
+              <a:t>3/15/2021</a:t>
             </a:fld>
             <a:endParaRPr lang="en-US"/>
           </a:p>
@@ -958,7 +961,7 @@
           <a:p>
             <a:fld id="{E25CC89C-45C9-47D1-BCFB-36AC0404138F}" type="datetimeFigureOut">
               <a:rPr lang="en-US" smtClean="0"/>
-              <a:t>3/13/2021</a:t>
+              <a:t>3/15/2021</a:t>
             </a:fld>
             <a:endParaRPr lang="en-US"/>
           </a:p>
@@ -1166,7 +1169,7 @@
           <a:p>
             <a:fld id="{E25CC89C-45C9-47D1-BCFB-36AC0404138F}" type="datetimeFigureOut">
               <a:rPr lang="en-US" smtClean="0"/>
-              <a:t>3/13/2021</a:t>
+              <a:t>3/15/2021</a:t>
             </a:fld>
             <a:endParaRPr lang="en-US"/>
           </a:p>
@@ -1364,7 +1367,7 @@
           <a:p>
             <a:fld id="{E25CC89C-45C9-47D1-BCFB-36AC0404138F}" type="datetimeFigureOut">
               <a:rPr lang="en-US" smtClean="0"/>
-              <a:t>3/13/2021</a:t>
+              <a:t>3/15/2021</a:t>
             </a:fld>
             <a:endParaRPr lang="en-US"/>
           </a:p>
@@ -1639,7 +1642,7 @@
           <a:p>
             <a:fld id="{E25CC89C-45C9-47D1-BCFB-36AC0404138F}" type="datetimeFigureOut">
               <a:rPr lang="en-US" smtClean="0"/>
-              <a:t>3/13/2021</a:t>
+              <a:t>3/15/2021</a:t>
             </a:fld>
             <a:endParaRPr lang="en-US"/>
           </a:p>
@@ -1904,7 +1907,7 @@
           <a:p>
             <a:fld id="{E25CC89C-45C9-47D1-BCFB-36AC0404138F}" type="datetimeFigureOut">
               <a:rPr lang="en-US" smtClean="0"/>
-              <a:t>3/13/2021</a:t>
+              <a:t>3/15/2021</a:t>
             </a:fld>
             <a:endParaRPr lang="en-US"/>
           </a:p>
@@ -2316,7 +2319,7 @@
           <a:p>
             <a:fld id="{E25CC89C-45C9-47D1-BCFB-36AC0404138F}" type="datetimeFigureOut">
               <a:rPr lang="en-US" smtClean="0"/>
-              <a:t>3/13/2021</a:t>
+              <a:t>3/15/2021</a:t>
             </a:fld>
             <a:endParaRPr lang="en-US"/>
           </a:p>
@@ -2457,7 +2460,7 @@
           <a:p>
             <a:fld id="{E25CC89C-45C9-47D1-BCFB-36AC0404138F}" type="datetimeFigureOut">
               <a:rPr lang="en-US" smtClean="0"/>
-              <a:t>3/13/2021</a:t>
+              <a:t>3/15/2021</a:t>
             </a:fld>
             <a:endParaRPr lang="en-US"/>
           </a:p>
@@ -2570,7 +2573,7 @@
           <a:p>
             <a:fld id="{E25CC89C-45C9-47D1-BCFB-36AC0404138F}" type="datetimeFigureOut">
               <a:rPr lang="en-US" smtClean="0"/>
-              <a:t>3/13/2021</a:t>
+              <a:t>3/15/2021</a:t>
             </a:fld>
             <a:endParaRPr lang="en-US"/>
           </a:p>
@@ -2881,7 +2884,7 @@
           <a:p>
             <a:fld id="{E25CC89C-45C9-47D1-BCFB-36AC0404138F}" type="datetimeFigureOut">
               <a:rPr lang="en-US" smtClean="0"/>
-              <a:t>3/13/2021</a:t>
+              <a:t>3/15/2021</a:t>
             </a:fld>
             <a:endParaRPr lang="en-US"/>
           </a:p>
@@ -3169,7 +3172,7 @@
           <a:p>
             <a:fld id="{E25CC89C-45C9-47D1-BCFB-36AC0404138F}" type="datetimeFigureOut">
               <a:rPr lang="en-US" smtClean="0"/>
-              <a:t>3/13/2021</a:t>
+              <a:t>3/15/2021</a:t>
             </a:fld>
             <a:endParaRPr lang="en-US"/>
           </a:p>
@@ -3410,7 +3413,7 @@
           <a:p>
             <a:fld id="{E25CC89C-45C9-47D1-BCFB-36AC0404138F}" type="datetimeFigureOut">
               <a:rPr lang="en-US" smtClean="0"/>
-              <a:t>3/13/2021</a:t>
+              <a:t>3/15/2021</a:t>
             </a:fld>
             <a:endParaRPr lang="en-US"/>
           </a:p>

</xml_diff>